<commit_message>
only need Dick dennis' stuff
</commit_message>
<xml_diff>
--- a/MediatorPattern/Presentation/Mediator Pattern.pptx
+++ b/MediatorPattern/Presentation/Mediator Pattern.pptx
@@ -6,6 +6,15 @@
   </p:sldMasterIdLst>
   <p:sldIdLst>
     <p:sldId id="256" r:id="rId2"/>
+    <p:sldId id="257" r:id="rId3"/>
+    <p:sldId id="258" r:id="rId4"/>
+    <p:sldId id="259" r:id="rId5"/>
+    <p:sldId id="265" r:id="rId6"/>
+    <p:sldId id="260" r:id="rId7"/>
+    <p:sldId id="261" r:id="rId8"/>
+    <p:sldId id="262" r:id="rId9"/>
+    <p:sldId id="263" r:id="rId10"/>
+    <p:sldId id="264" r:id="rId11"/>
   </p:sldIdLst>
   <p:sldSz cx="12192000" cy="6858000"/>
   <p:notesSz cx="6858000" cy="9144000"/>
@@ -3020,6 +3029,1186 @@
   <p:clrMapOvr>
     <a:masterClrMapping/>
   </p:clrMapOvr>
+  <p:timing>
+    <p:tnLst>
+      <p:par>
+        <p:cTn id="1" dur="indefinite" restart="never" nodeType="tmRoot"/>
+      </p:par>
+    </p:tnLst>
+  </p:timing>
+</p:sld>
+</file>
+
+<file path=ppt/slides/slide10.xml><?xml version="1.0" encoding="utf-8"?>
+<p:sld xmlns:a="http://schemas.openxmlformats.org/drawingml/2006/main" xmlns:r="http://schemas.openxmlformats.org/officeDocument/2006/relationships" xmlns:p="http://schemas.openxmlformats.org/presentationml/2006/main">
+  <p:cSld>
+    <p:spTree>
+      <p:nvGrpSpPr>
+        <p:cNvPr id="1" name=""/>
+        <p:cNvGrpSpPr/>
+        <p:nvPr/>
+      </p:nvGrpSpPr>
+      <p:grpSpPr>
+        <a:xfrm>
+          <a:off x="0" y="0"/>
+          <a:ext cx="0" cy="0"/>
+          <a:chOff x="0" y="0"/>
+          <a:chExt cx="0" cy="0"/>
+        </a:xfrm>
+      </p:grpSpPr>
+      <p:sp>
+        <p:nvSpPr>
+          <p:cNvPr id="3" name="Pladsholder til indhold 2"/>
+          <p:cNvSpPr>
+            <a:spLocks noGrp="1"/>
+          </p:cNvSpPr>
+          <p:nvPr>
+            <p:ph idx="1"/>
+          </p:nvPr>
+        </p:nvSpPr>
+        <p:spPr>
+          <a:xfrm>
+            <a:off x="838200" y="587022"/>
+            <a:ext cx="10515600" cy="6016978"/>
+          </a:xfrm>
+        </p:spPr>
+        <p:txBody>
+          <a:bodyPr>
+            <a:normAutofit/>
+          </a:bodyPr>
+          <a:lstStyle/>
+          <a:p>
+            <a:pPr marL="0" indent="0">
+              <a:buNone/>
+            </a:pPr>
+            <a:endParaRPr lang="en-US" dirty="0" smtClean="0"/>
+          </a:p>
+          <a:p>
+            <a:pPr marL="0" indent="0">
+              <a:buNone/>
+            </a:pPr>
+            <a:endParaRPr lang="en-US" dirty="0"/>
+          </a:p>
+          <a:p>
+            <a:pPr marL="0" indent="0">
+              <a:buNone/>
+            </a:pPr>
+            <a:endParaRPr lang="en-US" dirty="0" smtClean="0"/>
+          </a:p>
+          <a:p>
+            <a:pPr marL="0" indent="0">
+              <a:buNone/>
+            </a:pPr>
+            <a:r>
+              <a:rPr lang="en-US" dirty="0" smtClean="0"/>
+              <a:t>public virtual void Receive(string from, string message)</a:t>
+            </a:r>
+          </a:p>
+          <a:p>
+            <a:pPr marL="0" indent="0">
+              <a:buNone/>
+            </a:pPr>
+            <a:r>
+              <a:rPr lang="en-US" dirty="0" smtClean="0"/>
+              <a:t>{</a:t>
+            </a:r>
+          </a:p>
+          <a:p>
+            <a:pPr marL="0" indent="0">
+              <a:buNone/>
+            </a:pPr>
+            <a:r>
+              <a:rPr lang="en-US" dirty="0" smtClean="0"/>
+              <a:t>	</a:t>
+            </a:r>
+            <a:r>
+              <a:rPr lang="en-US" dirty="0" err="1" smtClean="0"/>
+              <a:t>Console.WriteLine</a:t>
+            </a:r>
+            <a:r>
+              <a:rPr lang="en-US" dirty="0" smtClean="0"/>
+              <a:t>(from + " to " + Name + ": " + message);</a:t>
+            </a:r>
+          </a:p>
+          <a:p>
+            <a:pPr marL="0" indent="0">
+              <a:buNone/>
+            </a:pPr>
+            <a:r>
+              <a:rPr lang="en-US" dirty="0" smtClean="0"/>
+              <a:t>}</a:t>
+            </a:r>
+          </a:p>
+        </p:txBody>
+      </p:sp>
+    </p:spTree>
+    <p:extLst>
+      <p:ext uri="{BB962C8B-B14F-4D97-AF65-F5344CB8AC3E}">
+        <p14:creationId xmlns:p14="http://schemas.microsoft.com/office/powerpoint/2010/main" val="1190895532"/>
+      </p:ext>
+    </p:extLst>
+  </p:cSld>
+  <p:clrMapOvr>
+    <a:masterClrMapping/>
+  </p:clrMapOvr>
+</p:sld>
+</file>
+
+<file path=ppt/slides/slide2.xml><?xml version="1.0" encoding="utf-8"?>
+<p:sld xmlns:a="http://schemas.openxmlformats.org/drawingml/2006/main" xmlns:r="http://schemas.openxmlformats.org/officeDocument/2006/relationships" xmlns:p="http://schemas.openxmlformats.org/presentationml/2006/main">
+  <p:cSld>
+    <p:spTree>
+      <p:nvGrpSpPr>
+        <p:cNvPr id="1" name=""/>
+        <p:cNvGrpSpPr/>
+        <p:nvPr/>
+      </p:nvGrpSpPr>
+      <p:grpSpPr>
+        <a:xfrm>
+          <a:off x="0" y="0"/>
+          <a:ext cx="0" cy="0"/>
+          <a:chOff x="0" y="0"/>
+          <a:chExt cx="0" cy="0"/>
+        </a:xfrm>
+      </p:grpSpPr>
+      <p:sp>
+        <p:nvSpPr>
+          <p:cNvPr id="2" name="Titel 1"/>
+          <p:cNvSpPr>
+            <a:spLocks noGrp="1"/>
+          </p:cNvSpPr>
+          <p:nvPr>
+            <p:ph type="title"/>
+          </p:nvPr>
+        </p:nvSpPr>
+        <p:spPr/>
+        <p:txBody>
+          <a:bodyPr/>
+          <a:lstStyle/>
+          <a:p>
+            <a:endParaRPr lang="da-DK"/>
+          </a:p>
+        </p:txBody>
+      </p:sp>
+      <p:pic>
+        <p:nvPicPr>
+          <p:cNvPr id="4" name="Pladsholder til indhold 3"/>
+          <p:cNvPicPr>
+            <a:picLocks noGrp="1" noChangeAspect="1"/>
+          </p:cNvPicPr>
+          <p:nvPr>
+            <p:ph idx="1"/>
+          </p:nvPr>
+        </p:nvPicPr>
+        <p:blipFill>
+          <a:blip r:embed="rId2">
+            <a:extLst>
+              <a:ext uri="{28A0092B-C50C-407E-A947-70E740481C1C}">
+                <a14:useLocalDpi xmlns:a14="http://schemas.microsoft.com/office/drawing/2010/main" val="0"/>
+              </a:ext>
+            </a:extLst>
+          </a:blip>
+          <a:stretch>
+            <a:fillRect/>
+          </a:stretch>
+        </p:blipFill>
+        <p:spPr>
+          <a:xfrm>
+            <a:off x="2706864" y="1690688"/>
+            <a:ext cx="6778272" cy="4186580"/>
+          </a:xfrm>
+        </p:spPr>
+      </p:pic>
+    </p:spTree>
+    <p:extLst>
+      <p:ext uri="{BB962C8B-B14F-4D97-AF65-F5344CB8AC3E}">
+        <p14:creationId xmlns:p14="http://schemas.microsoft.com/office/powerpoint/2010/main" val="2390638487"/>
+      </p:ext>
+    </p:extLst>
+  </p:cSld>
+  <p:clrMapOvr>
+    <a:masterClrMapping/>
+  </p:clrMapOvr>
+  <p:timing>
+    <p:tnLst>
+      <p:par>
+        <p:cTn id="1" dur="indefinite" restart="never" nodeType="tmRoot"/>
+      </p:par>
+    </p:tnLst>
+  </p:timing>
+</p:sld>
+</file>
+
+<file path=ppt/slides/slide3.xml><?xml version="1.0" encoding="utf-8"?>
+<p:sld xmlns:a="http://schemas.openxmlformats.org/drawingml/2006/main" xmlns:r="http://schemas.openxmlformats.org/officeDocument/2006/relationships" xmlns:p="http://schemas.openxmlformats.org/presentationml/2006/main">
+  <p:cSld>
+    <p:spTree>
+      <p:nvGrpSpPr>
+        <p:cNvPr id="1" name=""/>
+        <p:cNvGrpSpPr/>
+        <p:nvPr/>
+      </p:nvGrpSpPr>
+      <p:grpSpPr>
+        <a:xfrm>
+          <a:off x="0" y="0"/>
+          <a:ext cx="0" cy="0"/>
+          <a:chOff x="0" y="0"/>
+          <a:chExt cx="0" cy="0"/>
+        </a:xfrm>
+      </p:grpSpPr>
+      <p:sp>
+        <p:nvSpPr>
+          <p:cNvPr id="2" name="Titel 1"/>
+          <p:cNvSpPr>
+            <a:spLocks noGrp="1"/>
+          </p:cNvSpPr>
+          <p:nvPr>
+            <p:ph type="title"/>
+          </p:nvPr>
+        </p:nvSpPr>
+        <p:spPr/>
+        <p:txBody>
+          <a:bodyPr/>
+          <a:lstStyle/>
+          <a:p>
+            <a:endParaRPr lang="da-DK"/>
+          </a:p>
+        </p:txBody>
+      </p:sp>
+      <p:pic>
+        <p:nvPicPr>
+          <p:cNvPr id="4" name="Pladsholder til indhold 3"/>
+          <p:cNvPicPr>
+            <a:picLocks noGrp="1" noChangeAspect="1"/>
+          </p:cNvPicPr>
+          <p:nvPr>
+            <p:ph idx="1"/>
+          </p:nvPr>
+        </p:nvPicPr>
+        <p:blipFill>
+          <a:blip r:embed="rId2">
+            <a:extLst>
+              <a:ext uri="{28A0092B-C50C-407E-A947-70E740481C1C}">
+                <a14:useLocalDpi xmlns:a14="http://schemas.microsoft.com/office/drawing/2010/main" val="0"/>
+              </a:ext>
+            </a:extLst>
+          </a:blip>
+          <a:stretch>
+            <a:fillRect/>
+          </a:stretch>
+        </p:blipFill>
+        <p:spPr>
+          <a:xfrm>
+            <a:off x="3034241" y="1690688"/>
+            <a:ext cx="6123517" cy="4322483"/>
+          </a:xfrm>
+        </p:spPr>
+      </p:pic>
+    </p:spTree>
+    <p:extLst>
+      <p:ext uri="{BB962C8B-B14F-4D97-AF65-F5344CB8AC3E}">
+        <p14:creationId xmlns:p14="http://schemas.microsoft.com/office/powerpoint/2010/main" val="1809654582"/>
+      </p:ext>
+    </p:extLst>
+  </p:cSld>
+  <p:clrMapOvr>
+    <a:masterClrMapping/>
+  </p:clrMapOvr>
+  <p:timing>
+    <p:tnLst>
+      <p:par>
+        <p:cTn id="1" dur="indefinite" restart="never" nodeType="tmRoot"/>
+      </p:par>
+    </p:tnLst>
+  </p:timing>
+</p:sld>
+</file>
+
+<file path=ppt/slides/slide4.xml><?xml version="1.0" encoding="utf-8"?>
+<p:sld xmlns:a="http://schemas.openxmlformats.org/drawingml/2006/main" xmlns:r="http://schemas.openxmlformats.org/officeDocument/2006/relationships" xmlns:p="http://schemas.openxmlformats.org/presentationml/2006/main">
+  <p:cSld>
+    <p:spTree>
+      <p:nvGrpSpPr>
+        <p:cNvPr id="1" name=""/>
+        <p:cNvGrpSpPr/>
+        <p:nvPr/>
+      </p:nvGrpSpPr>
+      <p:grpSpPr>
+        <a:xfrm>
+          <a:off x="0" y="0"/>
+          <a:ext cx="0" cy="0"/>
+          <a:chOff x="0" y="0"/>
+          <a:chExt cx="0" cy="0"/>
+        </a:xfrm>
+      </p:grpSpPr>
+      <p:sp>
+        <p:nvSpPr>
+          <p:cNvPr id="2" name="Titel 1"/>
+          <p:cNvSpPr>
+            <a:spLocks noGrp="1"/>
+          </p:cNvSpPr>
+          <p:nvPr>
+            <p:ph type="title"/>
+          </p:nvPr>
+        </p:nvSpPr>
+        <p:spPr/>
+        <p:txBody>
+          <a:bodyPr/>
+          <a:lstStyle/>
+          <a:p>
+            <a:endParaRPr lang="da-DK"/>
+          </a:p>
+        </p:txBody>
+      </p:sp>
+      <p:pic>
+        <p:nvPicPr>
+          <p:cNvPr id="4" name="Pladsholder til indhold 3"/>
+          <p:cNvPicPr>
+            <a:picLocks noGrp="1" noChangeAspect="1"/>
+          </p:cNvPicPr>
+          <p:nvPr>
+            <p:ph idx="1"/>
+          </p:nvPr>
+        </p:nvPicPr>
+        <p:blipFill>
+          <a:blip r:embed="rId2">
+            <a:extLst>
+              <a:ext uri="{28A0092B-C50C-407E-A947-70E740481C1C}">
+                <a14:useLocalDpi xmlns:a14="http://schemas.microsoft.com/office/drawing/2010/main" val="0"/>
+              </a:ext>
+            </a:extLst>
+          </a:blip>
+          <a:stretch>
+            <a:fillRect/>
+          </a:stretch>
+        </p:blipFill>
+        <p:spPr>
+          <a:xfrm>
+            <a:off x="1995224" y="880532"/>
+            <a:ext cx="8201551" cy="5206119"/>
+          </a:xfrm>
+        </p:spPr>
+      </p:pic>
+    </p:spTree>
+    <p:extLst>
+      <p:ext uri="{BB962C8B-B14F-4D97-AF65-F5344CB8AC3E}">
+        <p14:creationId xmlns:p14="http://schemas.microsoft.com/office/powerpoint/2010/main" val="829415044"/>
+      </p:ext>
+    </p:extLst>
+  </p:cSld>
+  <p:clrMapOvr>
+    <a:masterClrMapping/>
+  </p:clrMapOvr>
+</p:sld>
+</file>
+
+<file path=ppt/slides/slide5.xml><?xml version="1.0" encoding="utf-8"?>
+<p:sld xmlns:a="http://schemas.openxmlformats.org/drawingml/2006/main" xmlns:r="http://schemas.openxmlformats.org/officeDocument/2006/relationships" xmlns:p="http://schemas.openxmlformats.org/presentationml/2006/main">
+  <p:cSld>
+    <p:spTree>
+      <p:nvGrpSpPr>
+        <p:cNvPr id="1" name=""/>
+        <p:cNvGrpSpPr/>
+        <p:nvPr/>
+      </p:nvGrpSpPr>
+      <p:grpSpPr>
+        <a:xfrm>
+          <a:off x="0" y="0"/>
+          <a:ext cx="0" cy="0"/>
+          <a:chOff x="0" y="0"/>
+          <a:chExt cx="0" cy="0"/>
+        </a:xfrm>
+      </p:grpSpPr>
+      <p:sp>
+        <p:nvSpPr>
+          <p:cNvPr id="3" name="Pladsholder til indhold 2"/>
+          <p:cNvSpPr>
+            <a:spLocks noGrp="1"/>
+          </p:cNvSpPr>
+          <p:nvPr>
+            <p:ph idx="1"/>
+          </p:nvPr>
+        </p:nvSpPr>
+        <p:spPr>
+          <a:xfrm>
+            <a:off x="838200" y="587022"/>
+            <a:ext cx="10515600" cy="6016978"/>
+          </a:xfrm>
+        </p:spPr>
+        <p:txBody>
+          <a:bodyPr>
+            <a:normAutofit/>
+          </a:bodyPr>
+          <a:lstStyle/>
+          <a:p>
+            <a:pPr marL="0" indent="0">
+              <a:buNone/>
+            </a:pPr>
+            <a:endParaRPr lang="en-US" dirty="0" smtClean="0"/>
+          </a:p>
+          <a:p>
+            <a:pPr marL="0" indent="0">
+              <a:buNone/>
+            </a:pPr>
+            <a:endParaRPr lang="en-US" dirty="0"/>
+          </a:p>
+          <a:p>
+            <a:pPr marL="0" indent="0">
+              <a:buNone/>
+            </a:pPr>
+            <a:endParaRPr lang="en-US" dirty="0" smtClean="0"/>
+          </a:p>
+        </p:txBody>
+      </p:sp>
+      <p:pic>
+        <p:nvPicPr>
+          <p:cNvPr id="2" name="Billede 1"/>
+          <p:cNvPicPr>
+            <a:picLocks noChangeAspect="1"/>
+          </p:cNvPicPr>
+          <p:nvPr/>
+        </p:nvPicPr>
+        <p:blipFill>
+          <a:blip r:embed="rId2">
+            <a:extLst>
+              <a:ext uri="{28A0092B-C50C-407E-A947-70E740481C1C}">
+                <a14:useLocalDpi xmlns:a14="http://schemas.microsoft.com/office/drawing/2010/main" val="0"/>
+              </a:ext>
+            </a:extLst>
+          </a:blip>
+          <a:stretch>
+            <a:fillRect/>
+          </a:stretch>
+        </p:blipFill>
+        <p:spPr>
+          <a:xfrm>
+            <a:off x="1842494" y="56679"/>
+            <a:ext cx="8507012" cy="6744641"/>
+          </a:xfrm>
+          <a:prstGeom prst="rect">
+            <a:avLst/>
+          </a:prstGeom>
+        </p:spPr>
+      </p:pic>
+    </p:spTree>
+    <p:extLst>
+      <p:ext uri="{BB962C8B-B14F-4D97-AF65-F5344CB8AC3E}">
+        <p14:creationId xmlns:p14="http://schemas.microsoft.com/office/powerpoint/2010/main" val="1014940622"/>
+      </p:ext>
+    </p:extLst>
+  </p:cSld>
+  <p:clrMapOvr>
+    <a:masterClrMapping/>
+  </p:clrMapOvr>
+</p:sld>
+</file>
+
+<file path=ppt/slides/slide6.xml><?xml version="1.0" encoding="utf-8"?>
+<p:sld xmlns:a="http://schemas.openxmlformats.org/drawingml/2006/main" xmlns:r="http://schemas.openxmlformats.org/officeDocument/2006/relationships" xmlns:p="http://schemas.openxmlformats.org/presentationml/2006/main">
+  <p:cSld>
+    <p:spTree>
+      <p:nvGrpSpPr>
+        <p:cNvPr id="1" name=""/>
+        <p:cNvGrpSpPr/>
+        <p:nvPr/>
+      </p:nvGrpSpPr>
+      <p:grpSpPr>
+        <a:xfrm>
+          <a:off x="0" y="0"/>
+          <a:ext cx="0" cy="0"/>
+          <a:chOff x="0" y="0"/>
+          <a:chExt cx="0" cy="0"/>
+        </a:xfrm>
+      </p:grpSpPr>
+      <p:sp>
+        <p:nvSpPr>
+          <p:cNvPr id="3" name="Pladsholder til indhold 2"/>
+          <p:cNvSpPr>
+            <a:spLocks noGrp="1"/>
+          </p:cNvSpPr>
+          <p:nvPr>
+            <p:ph idx="1"/>
+          </p:nvPr>
+        </p:nvSpPr>
+        <p:spPr>
+          <a:xfrm>
+            <a:off x="838200" y="587022"/>
+            <a:ext cx="10515600" cy="6016978"/>
+          </a:xfrm>
+        </p:spPr>
+        <p:txBody>
+          <a:bodyPr>
+            <a:normAutofit fontScale="92500" lnSpcReduction="10000"/>
+          </a:bodyPr>
+          <a:lstStyle/>
+          <a:p>
+            <a:pPr marL="0" indent="0">
+              <a:buNone/>
+            </a:pPr>
+            <a:r>
+              <a:rPr lang="da-DK" dirty="0" err="1" smtClean="0"/>
+              <a:t>static</a:t>
+            </a:r>
+            <a:r>
+              <a:rPr lang="da-DK" dirty="0" smtClean="0"/>
+              <a:t> </a:t>
+            </a:r>
+            <a:r>
+              <a:rPr lang="da-DK" dirty="0" err="1" smtClean="0"/>
+              <a:t>void</a:t>
+            </a:r>
+            <a:r>
+              <a:rPr lang="da-DK" dirty="0" smtClean="0"/>
+              <a:t> Main(</a:t>
+            </a:r>
+            <a:r>
+              <a:rPr lang="da-DK" dirty="0" err="1" smtClean="0"/>
+              <a:t>string</a:t>
+            </a:r>
+            <a:r>
+              <a:rPr lang="da-DK" dirty="0" smtClean="0"/>
+              <a:t>[] </a:t>
+            </a:r>
+            <a:r>
+              <a:rPr lang="da-DK" dirty="0" err="1" smtClean="0"/>
+              <a:t>args</a:t>
+            </a:r>
+            <a:r>
+              <a:rPr lang="da-DK" dirty="0" smtClean="0"/>
+              <a:t>)</a:t>
+            </a:r>
+          </a:p>
+          <a:p>
+            <a:pPr marL="0" indent="0">
+              <a:buNone/>
+            </a:pPr>
+            <a:r>
+              <a:rPr lang="da-DK" dirty="0" smtClean="0"/>
+              <a:t>{</a:t>
+            </a:r>
+          </a:p>
+          <a:p>
+            <a:pPr marL="0" indent="0">
+              <a:buNone/>
+            </a:pPr>
+            <a:r>
+              <a:rPr lang="da-DK" dirty="0" smtClean="0"/>
+              <a:t>	</a:t>
+            </a:r>
+            <a:r>
+              <a:rPr lang="da-DK" dirty="0" err="1" smtClean="0"/>
+              <a:t>Mediator</a:t>
+            </a:r>
+            <a:r>
+              <a:rPr lang="da-DK" dirty="0" smtClean="0"/>
+              <a:t> </a:t>
+            </a:r>
+            <a:r>
+              <a:rPr lang="da-DK" dirty="0" err="1" smtClean="0"/>
+              <a:t>Chatroom</a:t>
+            </a:r>
+            <a:r>
+              <a:rPr lang="da-DK" dirty="0" smtClean="0"/>
+              <a:t> = new </a:t>
+            </a:r>
+            <a:r>
+              <a:rPr lang="da-DK" dirty="0" err="1" smtClean="0"/>
+              <a:t>Mediator</a:t>
+            </a:r>
+            <a:r>
+              <a:rPr lang="da-DK" dirty="0" smtClean="0"/>
+              <a:t>();</a:t>
+            </a:r>
+          </a:p>
+          <a:p>
+            <a:pPr marL="0" indent="0">
+              <a:buNone/>
+            </a:pPr>
+            <a:r>
+              <a:rPr lang="da-DK" dirty="0" smtClean="0"/>
+              <a:t>	</a:t>
+            </a:r>
+          </a:p>
+          <a:p>
+            <a:pPr marL="0" indent="0">
+              <a:buNone/>
+            </a:pPr>
+            <a:r>
+              <a:rPr lang="da-DK" dirty="0" smtClean="0"/>
+              <a:t>	Participant Dennis = new Borger("Dennis");</a:t>
+            </a:r>
+          </a:p>
+          <a:p>
+            <a:pPr marL="0" indent="0">
+              <a:buNone/>
+            </a:pPr>
+            <a:r>
+              <a:rPr lang="da-DK" dirty="0" smtClean="0"/>
+              <a:t>	Participant Joachim = new Borger("Joachim");</a:t>
+            </a:r>
+          </a:p>
+          <a:p>
+            <a:pPr marL="0" indent="0">
+              <a:buNone/>
+            </a:pPr>
+            <a:r>
+              <a:rPr lang="da-DK" dirty="0" smtClean="0"/>
+              <a:t>	</a:t>
+            </a:r>
+          </a:p>
+          <a:p>
+            <a:pPr marL="0" indent="0">
+              <a:buNone/>
+            </a:pPr>
+            <a:r>
+              <a:rPr lang="da-DK" dirty="0" smtClean="0"/>
+              <a:t>	</a:t>
+            </a:r>
+            <a:r>
+              <a:rPr lang="da-DK" dirty="0" err="1" smtClean="0"/>
+              <a:t>Chatroom.Register</a:t>
+            </a:r>
+            <a:r>
+              <a:rPr lang="da-DK" dirty="0" smtClean="0"/>
+              <a:t>(Dennis);</a:t>
+            </a:r>
+          </a:p>
+          <a:p>
+            <a:pPr marL="0" indent="0">
+              <a:buNone/>
+            </a:pPr>
+            <a:r>
+              <a:rPr lang="da-DK" dirty="0" smtClean="0"/>
+              <a:t>	</a:t>
+            </a:r>
+            <a:r>
+              <a:rPr lang="da-DK" dirty="0" err="1" smtClean="0"/>
+              <a:t>Chatroom.Register</a:t>
+            </a:r>
+            <a:r>
+              <a:rPr lang="da-DK" dirty="0" smtClean="0"/>
+              <a:t>(Joachim);</a:t>
+            </a:r>
+          </a:p>
+          <a:p>
+            <a:pPr marL="0" indent="0">
+              <a:buNone/>
+            </a:pPr>
+            <a:r>
+              <a:rPr lang="da-DK" dirty="0" smtClean="0"/>
+              <a:t>	</a:t>
+            </a:r>
+          </a:p>
+          <a:p>
+            <a:pPr marL="0" indent="0">
+              <a:buNone/>
+            </a:pPr>
+            <a:r>
+              <a:rPr lang="da-DK" dirty="0" smtClean="0"/>
+              <a:t>	</a:t>
+            </a:r>
+            <a:r>
+              <a:rPr lang="da-DK" dirty="0" err="1" smtClean="0"/>
+              <a:t>Dennis.Send</a:t>
+            </a:r>
+            <a:r>
+              <a:rPr lang="da-DK" dirty="0" smtClean="0"/>
+              <a:t>("Joachim", "</a:t>
+            </a:r>
+            <a:r>
+              <a:rPr lang="da-DK" dirty="0" err="1" smtClean="0"/>
+              <a:t>Herro</a:t>
+            </a:r>
+            <a:r>
+              <a:rPr lang="da-DK" dirty="0" smtClean="0"/>
+              <a:t> Jokke!");</a:t>
+            </a:r>
+          </a:p>
+          <a:p>
+            <a:pPr marL="0" indent="0">
+              <a:buNone/>
+            </a:pPr>
+            <a:r>
+              <a:rPr lang="da-DK" dirty="0" smtClean="0"/>
+              <a:t>	</a:t>
+            </a:r>
+            <a:r>
+              <a:rPr lang="da-DK" dirty="0" err="1" smtClean="0"/>
+              <a:t>Joachim.Send</a:t>
+            </a:r>
+            <a:r>
+              <a:rPr lang="da-DK" dirty="0" smtClean="0"/>
+              <a:t>("Dennis", "</a:t>
+            </a:r>
+            <a:r>
+              <a:rPr lang="da-DK" dirty="0" err="1" smtClean="0"/>
+              <a:t>Hello</a:t>
+            </a:r>
+            <a:r>
+              <a:rPr lang="da-DK" dirty="0" smtClean="0"/>
+              <a:t> Dennis");</a:t>
+            </a:r>
+          </a:p>
+          <a:p>
+            <a:pPr marL="0" indent="0">
+              <a:buNone/>
+            </a:pPr>
+            <a:r>
+              <a:rPr lang="da-DK" dirty="0" smtClean="0"/>
+              <a:t>}</a:t>
+            </a:r>
+            <a:endParaRPr lang="da-DK" dirty="0"/>
+          </a:p>
+        </p:txBody>
+      </p:sp>
+    </p:spTree>
+    <p:extLst>
+      <p:ext uri="{BB962C8B-B14F-4D97-AF65-F5344CB8AC3E}">
+        <p14:creationId xmlns:p14="http://schemas.microsoft.com/office/powerpoint/2010/main" val="795434854"/>
+      </p:ext>
+    </p:extLst>
+  </p:cSld>
+  <p:clrMapOvr>
+    <a:masterClrMapping/>
+  </p:clrMapOvr>
+</p:sld>
+</file>
+
+<file path=ppt/slides/slide7.xml><?xml version="1.0" encoding="utf-8"?>
+<p:sld xmlns:a="http://schemas.openxmlformats.org/drawingml/2006/main" xmlns:r="http://schemas.openxmlformats.org/officeDocument/2006/relationships" xmlns:p="http://schemas.openxmlformats.org/presentationml/2006/main">
+  <p:cSld>
+    <p:spTree>
+      <p:nvGrpSpPr>
+        <p:cNvPr id="1" name=""/>
+        <p:cNvGrpSpPr/>
+        <p:nvPr/>
+      </p:nvGrpSpPr>
+      <p:grpSpPr>
+        <a:xfrm>
+          <a:off x="0" y="0"/>
+          <a:ext cx="0" cy="0"/>
+          <a:chOff x="0" y="0"/>
+          <a:chExt cx="0" cy="0"/>
+        </a:xfrm>
+      </p:grpSpPr>
+      <p:sp>
+        <p:nvSpPr>
+          <p:cNvPr id="3" name="Pladsholder til indhold 2"/>
+          <p:cNvSpPr>
+            <a:spLocks noGrp="1"/>
+          </p:cNvSpPr>
+          <p:nvPr>
+            <p:ph idx="1"/>
+          </p:nvPr>
+        </p:nvSpPr>
+        <p:spPr>
+          <a:xfrm>
+            <a:off x="838200" y="587022"/>
+            <a:ext cx="10515600" cy="6016978"/>
+          </a:xfrm>
+        </p:spPr>
+        <p:txBody>
+          <a:bodyPr>
+            <a:normAutofit/>
+          </a:bodyPr>
+          <a:lstStyle/>
+          <a:p>
+            <a:pPr marL="0" indent="0">
+              <a:buNone/>
+            </a:pPr>
+            <a:endParaRPr lang="da-DK" dirty="0" smtClean="0"/>
+          </a:p>
+          <a:p>
+            <a:pPr marL="0" indent="0">
+              <a:buNone/>
+            </a:pPr>
+            <a:r>
+              <a:rPr lang="da-DK" dirty="0" err="1" smtClean="0"/>
+              <a:t>protected</a:t>
+            </a:r>
+            <a:r>
+              <a:rPr lang="da-DK" dirty="0" smtClean="0"/>
+              <a:t> Dictionary&lt;</a:t>
+            </a:r>
+            <a:r>
+              <a:rPr lang="da-DK" dirty="0" err="1" smtClean="0"/>
+              <a:t>string</a:t>
+            </a:r>
+            <a:r>
+              <a:rPr lang="da-DK" dirty="0" smtClean="0"/>
+              <a:t>, </a:t>
+            </a:r>
+            <a:r>
+              <a:rPr lang="da-DK" dirty="0" err="1" smtClean="0"/>
+              <a:t>IParticipant</a:t>
+            </a:r>
+            <a:r>
+              <a:rPr lang="da-DK" dirty="0" smtClean="0"/>
+              <a:t>&gt; Participants;</a:t>
+            </a:r>
+          </a:p>
+          <a:p>
+            <a:pPr marL="0" indent="0">
+              <a:buNone/>
+            </a:pPr>
+            <a:endParaRPr lang="da-DK" dirty="0" smtClean="0"/>
+          </a:p>
+          <a:p>
+            <a:pPr marL="0" indent="0">
+              <a:buNone/>
+            </a:pPr>
+            <a:r>
+              <a:rPr lang="da-DK" dirty="0" smtClean="0"/>
+              <a:t>public virtual </a:t>
+            </a:r>
+            <a:r>
+              <a:rPr lang="da-DK" dirty="0" err="1" smtClean="0"/>
+              <a:t>void</a:t>
+            </a:r>
+            <a:r>
+              <a:rPr lang="da-DK" dirty="0" smtClean="0"/>
+              <a:t> Register(</a:t>
+            </a:r>
+            <a:r>
+              <a:rPr lang="da-DK" dirty="0" err="1" smtClean="0"/>
+              <a:t>IParticipant</a:t>
+            </a:r>
+            <a:r>
+              <a:rPr lang="da-DK" dirty="0" smtClean="0"/>
+              <a:t> participant)</a:t>
+            </a:r>
+          </a:p>
+          <a:p>
+            <a:pPr marL="0" indent="0">
+              <a:buNone/>
+            </a:pPr>
+            <a:r>
+              <a:rPr lang="da-DK" dirty="0" smtClean="0"/>
+              <a:t>{		</a:t>
+            </a:r>
+          </a:p>
+          <a:p>
+            <a:pPr marL="0" indent="0">
+              <a:buNone/>
+            </a:pPr>
+            <a:r>
+              <a:rPr lang="da-DK" dirty="0"/>
+              <a:t>	</a:t>
+            </a:r>
+            <a:r>
+              <a:rPr lang="da-DK" dirty="0" smtClean="0"/>
+              <a:t>Participants[</a:t>
+            </a:r>
+            <a:r>
+              <a:rPr lang="da-DK" dirty="0" err="1" smtClean="0"/>
+              <a:t>participant.Name</a:t>
+            </a:r>
+            <a:r>
+              <a:rPr lang="da-DK" dirty="0" smtClean="0"/>
+              <a:t>] = participant;</a:t>
+            </a:r>
+          </a:p>
+          <a:p>
+            <a:pPr marL="0" indent="0">
+              <a:buNone/>
+            </a:pPr>
+            <a:endParaRPr lang="da-DK" dirty="0" smtClean="0"/>
+          </a:p>
+          <a:p>
+            <a:pPr marL="0" indent="0">
+              <a:buNone/>
+            </a:pPr>
+            <a:r>
+              <a:rPr lang="da-DK" dirty="0" smtClean="0"/>
+              <a:t>	</a:t>
+            </a:r>
+            <a:r>
+              <a:rPr lang="da-DK" dirty="0" err="1" smtClean="0"/>
+              <a:t>participant.Mediator</a:t>
+            </a:r>
+            <a:r>
+              <a:rPr lang="da-DK" dirty="0" smtClean="0"/>
+              <a:t> = </a:t>
+            </a:r>
+            <a:r>
+              <a:rPr lang="da-DK" dirty="0" err="1" smtClean="0"/>
+              <a:t>this</a:t>
+            </a:r>
+            <a:r>
+              <a:rPr lang="da-DK" dirty="0" smtClean="0"/>
+              <a:t>;</a:t>
+            </a:r>
+          </a:p>
+          <a:p>
+            <a:pPr marL="0" indent="0">
+              <a:buNone/>
+            </a:pPr>
+            <a:r>
+              <a:rPr lang="da-DK" dirty="0" smtClean="0"/>
+              <a:t>}</a:t>
+            </a:r>
+            <a:endParaRPr lang="da-DK" dirty="0"/>
+          </a:p>
+        </p:txBody>
+      </p:sp>
+    </p:spTree>
+    <p:extLst>
+      <p:ext uri="{BB962C8B-B14F-4D97-AF65-F5344CB8AC3E}">
+        <p14:creationId xmlns:p14="http://schemas.microsoft.com/office/powerpoint/2010/main" val="1754567099"/>
+      </p:ext>
+    </p:extLst>
+  </p:cSld>
+  <p:clrMapOvr>
+    <a:masterClrMapping/>
+  </p:clrMapOvr>
+</p:sld>
+</file>
+
+<file path=ppt/slides/slide8.xml><?xml version="1.0" encoding="utf-8"?>
+<p:sld xmlns:a="http://schemas.openxmlformats.org/drawingml/2006/main" xmlns:r="http://schemas.openxmlformats.org/officeDocument/2006/relationships" xmlns:p="http://schemas.openxmlformats.org/presentationml/2006/main">
+  <p:cSld>
+    <p:spTree>
+      <p:nvGrpSpPr>
+        <p:cNvPr id="1" name=""/>
+        <p:cNvGrpSpPr/>
+        <p:nvPr/>
+      </p:nvGrpSpPr>
+      <p:grpSpPr>
+        <a:xfrm>
+          <a:off x="0" y="0"/>
+          <a:ext cx="0" cy="0"/>
+          <a:chOff x="0" y="0"/>
+          <a:chExt cx="0" cy="0"/>
+        </a:xfrm>
+      </p:grpSpPr>
+      <p:sp>
+        <p:nvSpPr>
+          <p:cNvPr id="3" name="Pladsholder til indhold 2"/>
+          <p:cNvSpPr>
+            <a:spLocks noGrp="1"/>
+          </p:cNvSpPr>
+          <p:nvPr>
+            <p:ph idx="1"/>
+          </p:nvPr>
+        </p:nvSpPr>
+        <p:spPr>
+          <a:xfrm>
+            <a:off x="838200" y="587022"/>
+            <a:ext cx="10515600" cy="6016978"/>
+          </a:xfrm>
+        </p:spPr>
+        <p:txBody>
+          <a:bodyPr>
+            <a:normAutofit/>
+          </a:bodyPr>
+          <a:lstStyle/>
+          <a:p>
+            <a:pPr marL="0" indent="0">
+              <a:buNone/>
+            </a:pPr>
+            <a:endParaRPr lang="en-US" dirty="0" smtClean="0"/>
+          </a:p>
+          <a:p>
+            <a:pPr marL="0" indent="0">
+              <a:buNone/>
+            </a:pPr>
+            <a:endParaRPr lang="en-US" dirty="0"/>
+          </a:p>
+          <a:p>
+            <a:pPr marL="0" indent="0">
+              <a:buNone/>
+            </a:pPr>
+            <a:endParaRPr lang="en-US" dirty="0" smtClean="0"/>
+          </a:p>
+          <a:p>
+            <a:pPr marL="0" indent="0">
+              <a:buNone/>
+            </a:pPr>
+            <a:r>
+              <a:rPr lang="en-US" dirty="0" smtClean="0"/>
+              <a:t>public virtual void Send(string to, string message)</a:t>
+            </a:r>
+          </a:p>
+          <a:p>
+            <a:pPr marL="0" indent="0">
+              <a:buNone/>
+            </a:pPr>
+            <a:r>
+              <a:rPr lang="en-US" dirty="0" smtClean="0"/>
+              <a:t>{</a:t>
+            </a:r>
+          </a:p>
+          <a:p>
+            <a:pPr marL="0" indent="0">
+              <a:buNone/>
+            </a:pPr>
+            <a:r>
+              <a:rPr lang="en-US" dirty="0" smtClean="0"/>
+              <a:t>	</a:t>
+            </a:r>
+            <a:r>
+              <a:rPr lang="en-US" dirty="0" err="1" smtClean="0"/>
+              <a:t>Mediator.Send</a:t>
+            </a:r>
+            <a:r>
+              <a:rPr lang="en-US" dirty="0" smtClean="0"/>
+              <a:t>(Name, to, message);</a:t>
+            </a:r>
+          </a:p>
+          <a:p>
+            <a:pPr marL="0" indent="0">
+              <a:buNone/>
+            </a:pPr>
+            <a:r>
+              <a:rPr lang="en-US" dirty="0" smtClean="0"/>
+              <a:t>}</a:t>
+            </a:r>
+            <a:endParaRPr lang="da-DK" dirty="0"/>
+          </a:p>
+        </p:txBody>
+      </p:sp>
+    </p:spTree>
+    <p:extLst>
+      <p:ext uri="{BB962C8B-B14F-4D97-AF65-F5344CB8AC3E}">
+        <p14:creationId xmlns:p14="http://schemas.microsoft.com/office/powerpoint/2010/main" val="2034148498"/>
+      </p:ext>
+    </p:extLst>
+  </p:cSld>
+  <p:clrMapOvr>
+    <a:masterClrMapping/>
+  </p:clrMapOvr>
+</p:sld>
+</file>
+
+<file path=ppt/slides/slide9.xml><?xml version="1.0" encoding="utf-8"?>
+<p:sld xmlns:a="http://schemas.openxmlformats.org/drawingml/2006/main" xmlns:r="http://schemas.openxmlformats.org/officeDocument/2006/relationships" xmlns:p="http://schemas.openxmlformats.org/presentationml/2006/main">
+  <p:cSld>
+    <p:spTree>
+      <p:nvGrpSpPr>
+        <p:cNvPr id="1" name=""/>
+        <p:cNvGrpSpPr/>
+        <p:nvPr/>
+      </p:nvGrpSpPr>
+      <p:grpSpPr>
+        <a:xfrm>
+          <a:off x="0" y="0"/>
+          <a:ext cx="0" cy="0"/>
+          <a:chOff x="0" y="0"/>
+          <a:chExt cx="0" cy="0"/>
+        </a:xfrm>
+      </p:grpSpPr>
+      <p:sp>
+        <p:nvSpPr>
+          <p:cNvPr id="3" name="Pladsholder til indhold 2"/>
+          <p:cNvSpPr>
+            <a:spLocks noGrp="1"/>
+          </p:cNvSpPr>
+          <p:nvPr>
+            <p:ph idx="1"/>
+          </p:nvPr>
+        </p:nvSpPr>
+        <p:spPr>
+          <a:xfrm>
+            <a:off x="838200" y="587022"/>
+            <a:ext cx="10515600" cy="6016978"/>
+          </a:xfrm>
+        </p:spPr>
+        <p:txBody>
+          <a:bodyPr>
+            <a:normAutofit/>
+          </a:bodyPr>
+          <a:lstStyle/>
+          <a:p>
+            <a:pPr marL="0" indent="0">
+              <a:buNone/>
+            </a:pPr>
+            <a:endParaRPr lang="en-US" dirty="0" smtClean="0"/>
+          </a:p>
+          <a:p>
+            <a:pPr marL="0" indent="0">
+              <a:buNone/>
+            </a:pPr>
+            <a:endParaRPr lang="en-US" dirty="0"/>
+          </a:p>
+          <a:p>
+            <a:pPr marL="0" indent="0">
+              <a:buNone/>
+            </a:pPr>
+            <a:endParaRPr lang="en-US" dirty="0" smtClean="0"/>
+          </a:p>
+          <a:p>
+            <a:pPr marL="0" indent="0">
+              <a:buNone/>
+            </a:pPr>
+            <a:r>
+              <a:rPr lang="en-US" dirty="0" smtClean="0"/>
+              <a:t>public virtual void Send(string from, string to, string message)</a:t>
+            </a:r>
+          </a:p>
+          <a:p>
+            <a:pPr marL="0" indent="0">
+              <a:buNone/>
+            </a:pPr>
+            <a:r>
+              <a:rPr lang="en-US" dirty="0" smtClean="0"/>
+              <a:t>{</a:t>
+            </a:r>
+          </a:p>
+          <a:p>
+            <a:pPr marL="0" indent="0">
+              <a:buNone/>
+            </a:pPr>
+            <a:r>
+              <a:rPr lang="en-US" dirty="0" smtClean="0"/>
+              <a:t>	</a:t>
+            </a:r>
+            <a:r>
+              <a:rPr lang="en-US" dirty="0" err="1" smtClean="0"/>
+              <a:t>IParticipant</a:t>
+            </a:r>
+            <a:r>
+              <a:rPr lang="en-US" dirty="0" smtClean="0"/>
+              <a:t> participant = Participants[to];</a:t>
+            </a:r>
+          </a:p>
+          <a:p>
+            <a:pPr marL="0" indent="0">
+              <a:buNone/>
+            </a:pPr>
+            <a:r>
+              <a:rPr lang="en-US" dirty="0" smtClean="0"/>
+              <a:t>	</a:t>
+            </a:r>
+            <a:r>
+              <a:rPr lang="en-US" dirty="0" err="1" smtClean="0"/>
+              <a:t>participant.Receive</a:t>
+            </a:r>
+            <a:r>
+              <a:rPr lang="en-US" dirty="0" smtClean="0"/>
+              <a:t>(from, message);</a:t>
+            </a:r>
+          </a:p>
+          <a:p>
+            <a:pPr marL="0" indent="0">
+              <a:buNone/>
+            </a:pPr>
+            <a:r>
+              <a:rPr lang="en-US" dirty="0" smtClean="0"/>
+              <a:t>}</a:t>
+            </a:r>
+          </a:p>
+        </p:txBody>
+      </p:sp>
+    </p:spTree>
+    <p:extLst>
+      <p:ext uri="{BB962C8B-B14F-4D97-AF65-F5344CB8AC3E}">
+        <p14:creationId xmlns:p14="http://schemas.microsoft.com/office/powerpoint/2010/main" val="2876296758"/>
+      </p:ext>
+    </p:extLst>
+  </p:cSld>
+  <p:clrMapOvr>
+    <a:masterClrMapping/>
+  </p:clrMapOvr>
 </p:sld>
 </file>
 

</xml_diff>

<commit_message>
ppt done, needs test
</commit_message>
<xml_diff>
--- a/MediatorPattern/Presentation/Mediator Pattern.pptx
+++ b/MediatorPattern/Presentation/Mediator Pattern.pptx
@@ -15,6 +15,9 @@
     <p:sldId id="262" r:id="rId9"/>
     <p:sldId id="263" r:id="rId10"/>
     <p:sldId id="264" r:id="rId11"/>
+    <p:sldId id="266" r:id="rId12"/>
+    <p:sldId id="267" r:id="rId13"/>
+    <p:sldId id="268" r:id="rId14"/>
   </p:sldIdLst>
   <p:sldSz cx="12192000" cy="6858000"/>
   <p:notesSz cx="6858000" cy="9144000"/>
@@ -3154,6 +3157,244 @@
 </p:sld>
 </file>
 
+<file path=ppt/slides/slide11.xml><?xml version="1.0" encoding="utf-8"?>
+<p:sld xmlns:a="http://schemas.openxmlformats.org/drawingml/2006/main" xmlns:r="http://schemas.openxmlformats.org/officeDocument/2006/relationships" xmlns:p="http://schemas.openxmlformats.org/presentationml/2006/main">
+  <p:cSld>
+    <p:spTree>
+      <p:nvGrpSpPr>
+        <p:cNvPr id="1" name=""/>
+        <p:cNvGrpSpPr/>
+        <p:nvPr/>
+      </p:nvGrpSpPr>
+      <p:grpSpPr>
+        <a:xfrm>
+          <a:off x="0" y="0"/>
+          <a:ext cx="0" cy="0"/>
+          <a:chOff x="0" y="0"/>
+          <a:chExt cx="0" cy="0"/>
+        </a:xfrm>
+      </p:grpSpPr>
+      <p:sp>
+        <p:nvSpPr>
+          <p:cNvPr id="2" name="Titel 1"/>
+          <p:cNvSpPr>
+            <a:spLocks noGrp="1"/>
+          </p:cNvSpPr>
+          <p:nvPr>
+            <p:ph type="title"/>
+          </p:nvPr>
+        </p:nvSpPr>
+        <p:spPr/>
+        <p:txBody>
+          <a:bodyPr/>
+          <a:lstStyle/>
+          <a:p>
+            <a:r>
+              <a:rPr lang="da-DK" dirty="0" smtClean="0"/>
+              <a:t>Sammenligning med </a:t>
+            </a:r>
+            <a:br>
+              <a:rPr lang="da-DK" dirty="0" smtClean="0"/>
+            </a:br>
+            <a:r>
+              <a:rPr lang="da-DK" dirty="0" err="1" smtClean="0"/>
+              <a:t>publisher-subscriber</a:t>
+            </a:r>
+            <a:endParaRPr lang="da-DK" dirty="0"/>
+          </a:p>
+        </p:txBody>
+      </p:sp>
+      <p:sp>
+        <p:nvSpPr>
+          <p:cNvPr id="3" name="Pladsholder til tekst 2"/>
+          <p:cNvSpPr>
+            <a:spLocks noGrp="1"/>
+          </p:cNvSpPr>
+          <p:nvPr>
+            <p:ph type="body" idx="1"/>
+          </p:nvPr>
+        </p:nvSpPr>
+        <p:spPr/>
+        <p:txBody>
+          <a:bodyPr/>
+          <a:lstStyle/>
+          <a:p>
+            <a:r>
+              <a:rPr lang="da-DK" dirty="0" smtClean="0"/>
+              <a:t>Forskelle og ligheder</a:t>
+            </a:r>
+            <a:endParaRPr lang="da-DK" dirty="0"/>
+          </a:p>
+        </p:txBody>
+      </p:sp>
+    </p:spTree>
+    <p:extLst>
+      <p:ext uri="{BB962C8B-B14F-4D97-AF65-F5344CB8AC3E}">
+        <p14:creationId xmlns:p14="http://schemas.microsoft.com/office/powerpoint/2010/main" val="2207271789"/>
+      </p:ext>
+    </p:extLst>
+  </p:cSld>
+  <p:clrMapOvr>
+    <a:masterClrMapping/>
+  </p:clrMapOvr>
+</p:sld>
+</file>
+
+<file path=ppt/slides/slide12.xml><?xml version="1.0" encoding="utf-8"?>
+<p:sld xmlns:a="http://schemas.openxmlformats.org/drawingml/2006/main" xmlns:r="http://schemas.openxmlformats.org/officeDocument/2006/relationships" xmlns:p="http://schemas.openxmlformats.org/presentationml/2006/main">
+  <p:cSld>
+    <p:spTree>
+      <p:nvGrpSpPr>
+        <p:cNvPr id="1" name=""/>
+        <p:cNvGrpSpPr/>
+        <p:nvPr/>
+      </p:nvGrpSpPr>
+      <p:grpSpPr>
+        <a:xfrm>
+          <a:off x="0" y="0"/>
+          <a:ext cx="0" cy="0"/>
+          <a:chOff x="0" y="0"/>
+          <a:chExt cx="0" cy="0"/>
+        </a:xfrm>
+      </p:grpSpPr>
+      <p:sp>
+        <p:nvSpPr>
+          <p:cNvPr id="2" name="Titel 1"/>
+          <p:cNvSpPr>
+            <a:spLocks noGrp="1"/>
+          </p:cNvSpPr>
+          <p:nvPr>
+            <p:ph type="title"/>
+          </p:nvPr>
+        </p:nvSpPr>
+        <p:spPr/>
+        <p:txBody>
+          <a:bodyPr/>
+          <a:lstStyle/>
+          <a:p>
+            <a:r>
+              <a:rPr lang="da-DK" dirty="0" smtClean="0"/>
+              <a:t>Ulemper ved </a:t>
+            </a:r>
+            <a:br>
+              <a:rPr lang="da-DK" dirty="0" smtClean="0"/>
+            </a:br>
+            <a:r>
+              <a:rPr lang="da-DK" dirty="0" err="1" smtClean="0"/>
+              <a:t>mediator</a:t>
+            </a:r>
+            <a:r>
+              <a:rPr lang="da-DK" dirty="0" smtClean="0"/>
+              <a:t> pattern</a:t>
+            </a:r>
+            <a:endParaRPr lang="da-DK" dirty="0"/>
+          </a:p>
+        </p:txBody>
+      </p:sp>
+      <p:sp>
+        <p:nvSpPr>
+          <p:cNvPr id="3" name="Pladsholder til tekst 2"/>
+          <p:cNvSpPr>
+            <a:spLocks noGrp="1"/>
+          </p:cNvSpPr>
+          <p:nvPr>
+            <p:ph type="body" idx="1"/>
+          </p:nvPr>
+        </p:nvSpPr>
+        <p:spPr/>
+        <p:txBody>
+          <a:bodyPr/>
+          <a:lstStyle/>
+          <a:p>
+            <a:endParaRPr lang="da-DK" dirty="0"/>
+          </a:p>
+        </p:txBody>
+      </p:sp>
+    </p:spTree>
+    <p:extLst>
+      <p:ext uri="{BB962C8B-B14F-4D97-AF65-F5344CB8AC3E}">
+        <p14:creationId xmlns:p14="http://schemas.microsoft.com/office/powerpoint/2010/main" val="3459454468"/>
+      </p:ext>
+    </p:extLst>
+  </p:cSld>
+  <p:clrMapOvr>
+    <a:masterClrMapping/>
+  </p:clrMapOvr>
+</p:sld>
+</file>
+
+<file path=ppt/slides/slide13.xml><?xml version="1.0" encoding="utf-8"?>
+<p:sld xmlns:a="http://schemas.openxmlformats.org/drawingml/2006/main" xmlns:r="http://schemas.openxmlformats.org/officeDocument/2006/relationships" xmlns:p="http://schemas.openxmlformats.org/presentationml/2006/main">
+  <p:cSld>
+    <p:spTree>
+      <p:nvGrpSpPr>
+        <p:cNvPr id="1" name=""/>
+        <p:cNvGrpSpPr/>
+        <p:nvPr/>
+      </p:nvGrpSpPr>
+      <p:grpSpPr>
+        <a:xfrm>
+          <a:off x="0" y="0"/>
+          <a:ext cx="0" cy="0"/>
+          <a:chOff x="0" y="0"/>
+          <a:chExt cx="0" cy="0"/>
+        </a:xfrm>
+      </p:grpSpPr>
+      <p:sp>
+        <p:nvSpPr>
+          <p:cNvPr id="2" name="Titel 1"/>
+          <p:cNvSpPr>
+            <a:spLocks noGrp="1"/>
+          </p:cNvSpPr>
+          <p:nvPr>
+            <p:ph type="title"/>
+          </p:nvPr>
+        </p:nvSpPr>
+        <p:spPr/>
+        <p:txBody>
+          <a:bodyPr/>
+          <a:lstStyle/>
+          <a:p>
+            <a:r>
+              <a:rPr lang="da-DK" smtClean="0"/>
+              <a:t>Konklusion</a:t>
+            </a:r>
+            <a:endParaRPr lang="da-DK" dirty="0"/>
+          </a:p>
+        </p:txBody>
+      </p:sp>
+      <p:sp>
+        <p:nvSpPr>
+          <p:cNvPr id="3" name="Pladsholder til tekst 2"/>
+          <p:cNvSpPr>
+            <a:spLocks noGrp="1"/>
+          </p:cNvSpPr>
+          <p:nvPr>
+            <p:ph type="body" idx="1"/>
+          </p:nvPr>
+        </p:nvSpPr>
+        <p:spPr/>
+        <p:txBody>
+          <a:bodyPr/>
+          <a:lstStyle/>
+          <a:p>
+            <a:endParaRPr lang="da-DK" dirty="0"/>
+          </a:p>
+        </p:txBody>
+      </p:sp>
+    </p:spTree>
+    <p:extLst>
+      <p:ext uri="{BB962C8B-B14F-4D97-AF65-F5344CB8AC3E}">
+        <p14:creationId xmlns:p14="http://schemas.microsoft.com/office/powerpoint/2010/main" val="382066738"/>
+      </p:ext>
+    </p:extLst>
+  </p:cSld>
+  <p:clrMapOvr>
+    <a:masterClrMapping/>
+  </p:clrMapOvr>
+</p:sld>
+</file>
+
 <file path=ppt/slides/slide2.xml><?xml version="1.0" encoding="utf-8"?>
 <p:sld xmlns:a="http://schemas.openxmlformats.org/drawingml/2006/main" xmlns:r="http://schemas.openxmlformats.org/officeDocument/2006/relationships" xmlns:p="http://schemas.openxmlformats.org/presentationml/2006/main">
   <p:cSld>

</xml_diff>